<commit_message>
actualizacion a draft de ppt
</commit_message>
<xml_diff>
--- a/Git Fundamentos.pptx
+++ b/Git Fundamentos.pptx
@@ -11104,14 +11104,6 @@
               <a:rPr lang="es-SV" dirty="0"/>
               <a:t>Fundamentos</a:t>
             </a:r>
-            <a:r>
-              <a:rPr lang="en-US" dirty="0"/>
-              <a:t> para un </a:t>
-            </a:r>
-            <a:r>
-              <a:rPr lang="es-SV" dirty="0"/>
-              <a:t>sobrevivir</a:t>
-            </a:r>
           </a:p>
         </p:txBody>
       </p:sp>
@@ -24986,7 +24978,7 @@
               <a:t> las bases de Git para </a:t>
             </a:r>
             <a:r>
-              <a:rPr lang="en-US" sz="2800" dirty="0" err="1">
+              <a:rPr lang="es-SV" sz="2800" dirty="0">
                 <a:solidFill>
                   <a:srgbClr val="FFFFFF"/>
                 </a:solidFill>
@@ -25018,18 +25010,13 @@
               <a:t>  </a:t>
             </a:r>
             <a:r>
-              <a:rPr lang="en-US" sz="2800" dirty="0" err="1">
+              <a:rPr lang="es-SV" sz="2800" dirty="0">
                 <a:solidFill>
                   <a:srgbClr val="FFFFFF"/>
                 </a:solidFill>
               </a:rPr>
               <a:t>funciona</a:t>
             </a:r>
-            <a:endParaRPr lang="en-US" sz="2800" dirty="0">
-              <a:solidFill>
-                <a:srgbClr val="FFFFFF"/>
-              </a:solidFill>
-            </a:endParaRPr>
           </a:p>
           <a:p>
             <a:endParaRPr lang="en-US" sz="2800" dirty="0">

</xml_diff>